<commit_message>
updated data pipeline slides, added weekly notes
</commit_message>
<xml_diff>
--- a/dataPipelineProcess.pptx
+++ b/dataPipelineProcess.pptx
@@ -13,9 +13,16 @@
     <p:sldId id="262" r:id="rId7"/>
     <p:sldId id="263" r:id="rId8"/>
     <p:sldId id="264" r:id="rId9"/>
-    <p:sldId id="265" r:id="rId10"/>
-    <p:sldId id="266" r:id="rId11"/>
-    <p:sldId id="267" r:id="rId12"/>
+    <p:sldId id="268" r:id="rId10"/>
+    <p:sldId id="265" r:id="rId11"/>
+    <p:sldId id="266" r:id="rId12"/>
+    <p:sldId id="267" r:id="rId13"/>
+    <p:sldId id="269" r:id="rId14"/>
+    <p:sldId id="270" r:id="rId15"/>
+    <p:sldId id="271" r:id="rId16"/>
+    <p:sldId id="272" r:id="rId17"/>
+    <p:sldId id="273" r:id="rId18"/>
+    <p:sldId id="274" r:id="rId19"/>
   </p:sldIdLst>
   <p:sldSz cx="12192000" cy="6858000"/>
   <p:notesSz cx="6858000" cy="9144000"/>
@@ -122,6 +129,46 @@
 </p:presentation>
 </file>
 
+<file path=ppt/commentAuthors.xml><?xml version="1.0" encoding="utf-8"?>
+<p:cmAuthorLst xmlns:a="http://schemas.openxmlformats.org/drawingml/2006/main" xmlns:r="http://schemas.openxmlformats.org/officeDocument/2006/relationships" xmlns:p="http://schemas.openxmlformats.org/presentationml/2006/main">
+  <p:cmAuthor id="1" name="Ansgar Jordan" initials="AJ" lastIdx="2" clrIdx="0">
+    <p:extLst>
+      <p:ext uri="{19B8F6BF-5375-455C-9EA6-DF929625EA0E}">
+        <p15:presenceInfo xmlns:p15="http://schemas.microsoft.com/office/powerpoint/2012/main" userId="62a7c590d7d13a82" providerId="Windows Live"/>
+      </p:ext>
+    </p:extLst>
+  </p:cmAuthor>
+</p:cmAuthorLst>
+</file>
+
+<file path=ppt/comments/comment1.xml><?xml version="1.0" encoding="utf-8"?>
+<p:cmLst xmlns:a="http://schemas.openxmlformats.org/drawingml/2006/main" xmlns:r="http://schemas.openxmlformats.org/officeDocument/2006/relationships" xmlns:p="http://schemas.openxmlformats.org/presentationml/2006/main">
+  <p:cm authorId="1" dt="2022-07-20T14:42:35.383" idx="2">
+    <p:pos x="10" y="10"/>
+    <p:text>Note: not sure if this is from exp 3A, 3B or combined.</p:text>
+    <p:extLst>
+      <p:ext uri="{C676402C-5697-4E1C-873F-D02D1690AC5C}">
+        <p15:threadingInfo xmlns:p15="http://schemas.microsoft.com/office/powerpoint/2012/main" timeZoneBias="240"/>
+      </p:ext>
+    </p:extLst>
+  </p:cm>
+</p:cmLst>
+</file>
+
+<file path=ppt/comments/comment2.xml><?xml version="1.0" encoding="utf-8"?>
+<p:cmLst xmlns:a="http://schemas.openxmlformats.org/drawingml/2006/main" xmlns:r="http://schemas.openxmlformats.org/officeDocument/2006/relationships" xmlns:p="http://schemas.openxmlformats.org/presentationml/2006/main">
+  <p:cm authorId="1" dt="2022-07-20T13:22:52.448" idx="1">
+    <p:pos x="2472" y="2628"/>
+    <p:text>might have to play around with this parameter b/c of dying cells</p:text>
+    <p:extLst>
+      <p:ext uri="{C676402C-5697-4E1C-873F-D02D1690AC5C}">
+        <p15:threadingInfo xmlns:p15="http://schemas.microsoft.com/office/powerpoint/2012/main" timeZoneBias="240"/>
+      </p:ext>
+    </p:extLst>
+  </p:cm>
+</p:cmLst>
+</file>
+
 <file path=ppt/slideLayouts/slideLayout1.xml><?xml version="1.0" encoding="utf-8"?>
 <p:sldLayout xmlns:a="http://schemas.openxmlformats.org/drawingml/2006/main" xmlns:r="http://schemas.openxmlformats.org/officeDocument/2006/relationships" xmlns:p="http://schemas.openxmlformats.org/presentationml/2006/main" type="title" preserve="1">
   <p:cSld name="Title Slide">
@@ -269,7 +316,7 @@
           <a:p>
             <a:fld id="{F0ED96FC-D4A6-4491-AB0C-060361030AF8}" type="datetimeFigureOut">
               <a:rPr lang="en-US" smtClean="0"/>
-              <a:t>7/19/2022</a:t>
+              <a:t>7/20/2022</a:t>
             </a:fld>
             <a:endParaRPr lang="en-US"/>
           </a:p>
@@ -467,7 +514,7 @@
           <a:p>
             <a:fld id="{F0ED96FC-D4A6-4491-AB0C-060361030AF8}" type="datetimeFigureOut">
               <a:rPr lang="en-US" smtClean="0"/>
-              <a:t>7/19/2022</a:t>
+              <a:t>7/20/2022</a:t>
             </a:fld>
             <a:endParaRPr lang="en-US"/>
           </a:p>
@@ -675,7 +722,7 @@
           <a:p>
             <a:fld id="{F0ED96FC-D4A6-4491-AB0C-060361030AF8}" type="datetimeFigureOut">
               <a:rPr lang="en-US" smtClean="0"/>
-              <a:t>7/19/2022</a:t>
+              <a:t>7/20/2022</a:t>
             </a:fld>
             <a:endParaRPr lang="en-US"/>
           </a:p>
@@ -873,7 +920,7 @@
           <a:p>
             <a:fld id="{F0ED96FC-D4A6-4491-AB0C-060361030AF8}" type="datetimeFigureOut">
               <a:rPr lang="en-US" smtClean="0"/>
-              <a:t>7/19/2022</a:t>
+              <a:t>7/20/2022</a:t>
             </a:fld>
             <a:endParaRPr lang="en-US"/>
           </a:p>
@@ -1148,7 +1195,7 @@
           <a:p>
             <a:fld id="{F0ED96FC-D4A6-4491-AB0C-060361030AF8}" type="datetimeFigureOut">
               <a:rPr lang="en-US" smtClean="0"/>
-              <a:t>7/19/2022</a:t>
+              <a:t>7/20/2022</a:t>
             </a:fld>
             <a:endParaRPr lang="en-US"/>
           </a:p>
@@ -1413,7 +1460,7 @@
           <a:p>
             <a:fld id="{F0ED96FC-D4A6-4491-AB0C-060361030AF8}" type="datetimeFigureOut">
               <a:rPr lang="en-US" smtClean="0"/>
-              <a:t>7/19/2022</a:t>
+              <a:t>7/20/2022</a:t>
             </a:fld>
             <a:endParaRPr lang="en-US"/>
           </a:p>
@@ -1825,7 +1872,7 @@
           <a:p>
             <a:fld id="{F0ED96FC-D4A6-4491-AB0C-060361030AF8}" type="datetimeFigureOut">
               <a:rPr lang="en-US" smtClean="0"/>
-              <a:t>7/19/2022</a:t>
+              <a:t>7/20/2022</a:t>
             </a:fld>
             <a:endParaRPr lang="en-US"/>
           </a:p>
@@ -1966,7 +2013,7 @@
           <a:p>
             <a:fld id="{F0ED96FC-D4A6-4491-AB0C-060361030AF8}" type="datetimeFigureOut">
               <a:rPr lang="en-US" smtClean="0"/>
-              <a:t>7/19/2022</a:t>
+              <a:t>7/20/2022</a:t>
             </a:fld>
             <a:endParaRPr lang="en-US"/>
           </a:p>
@@ -2079,7 +2126,7 @@
           <a:p>
             <a:fld id="{F0ED96FC-D4A6-4491-AB0C-060361030AF8}" type="datetimeFigureOut">
               <a:rPr lang="en-US" smtClean="0"/>
-              <a:t>7/19/2022</a:t>
+              <a:t>7/20/2022</a:t>
             </a:fld>
             <a:endParaRPr lang="en-US"/>
           </a:p>
@@ -2390,7 +2437,7 @@
           <a:p>
             <a:fld id="{F0ED96FC-D4A6-4491-AB0C-060361030AF8}" type="datetimeFigureOut">
               <a:rPr lang="en-US" smtClean="0"/>
-              <a:t>7/19/2022</a:t>
+              <a:t>7/20/2022</a:t>
             </a:fld>
             <a:endParaRPr lang="en-US"/>
           </a:p>
@@ -2678,7 +2725,7 @@
           <a:p>
             <a:fld id="{F0ED96FC-D4A6-4491-AB0C-060361030AF8}" type="datetimeFigureOut">
               <a:rPr lang="en-US" smtClean="0"/>
-              <a:t>7/19/2022</a:t>
+              <a:t>7/20/2022</a:t>
             </a:fld>
             <a:endParaRPr lang="en-US"/>
           </a:p>
@@ -2919,7 +2966,7 @@
           <a:p>
             <a:fld id="{F0ED96FC-D4A6-4491-AB0C-060361030AF8}" type="datetimeFigureOut">
               <a:rPr lang="en-US" smtClean="0"/>
-              <a:t>7/19/2022</a:t>
+              <a:t>7/20/2022</a:t>
             </a:fld>
             <a:endParaRPr lang="en-US"/>
           </a:p>
@@ -3442,7 +3489,7 @@
           <p:cNvPr id="2" name="Title 1">
             <a:extLst>
               <a:ext uri="{FF2B5EF4-FFF2-40B4-BE49-F238E27FC236}">
-                <a16:creationId xmlns:a16="http://schemas.microsoft.com/office/drawing/2014/main" id="{1EFDED0D-05FD-AB0A-BE84-A16E28E591D5}"/>
+                <a16:creationId xmlns:a16="http://schemas.microsoft.com/office/drawing/2014/main" id="{FD4E3876-23D6-D5A7-5981-14DD17E82E21}"/>
               </a:ext>
             </a:extLst>
           </p:cNvPr>
@@ -3460,7 +3507,7 @@
           <a:p>
             <a:r>
               <a:rPr lang="en-US" dirty="0"/>
-              <a:t>Visualizing PCA (continued)</a:t>
+              <a:t>Visualizing PCA</a:t>
             </a:r>
           </a:p>
         </p:txBody>
@@ -3470,7 +3517,7 @@
           <p:cNvPr id="3" name="Content Placeholder 2">
             <a:extLst>
               <a:ext uri="{FF2B5EF4-FFF2-40B4-BE49-F238E27FC236}">
-                <a16:creationId xmlns:a16="http://schemas.microsoft.com/office/drawing/2014/main" id="{CAF2F9F6-3B56-9415-533B-A37A891C759A}"/>
+                <a16:creationId xmlns:a16="http://schemas.microsoft.com/office/drawing/2014/main" id="{340AFA08-1435-31AC-F44C-E2890B7A820D}"/>
               </a:ext>
             </a:extLst>
           </p:cNvPr>
@@ -3486,14 +3533,84 @@
           <a:bodyPr/>
           <a:lstStyle/>
           <a:p>
-            <a:endParaRPr lang="en-US"/>
-          </a:p>
-        </p:txBody>
-      </p:sp>
+            <a:r>
+              <a:rPr lang="en-US" dirty="0"/>
+              <a:t>The goal of PCA visualization, ultimately, is to determine how many PC’s we will choose as input to our clustering function. This is because clustering occurs in the PC space (</a:t>
+            </a:r>
+            <a:r>
+              <a:rPr lang="en-US" dirty="0" err="1"/>
+              <a:t>i.e</a:t>
+            </a:r>
+            <a:r>
+              <a:rPr lang="en-US" dirty="0"/>
+              <a:t> around 5-20 dimensions)</a:t>
+            </a:r>
+          </a:p>
+          <a:p>
+            <a:r>
+              <a:rPr lang="en-US" dirty="0"/>
+              <a:t>On the way, however, we can look at the features (genes) most highly correlated with different PC’s:</a:t>
+            </a:r>
+          </a:p>
+          <a:p>
+            <a:endParaRPr lang="en-US" dirty="0"/>
+          </a:p>
+          <a:p>
+            <a:endParaRPr lang="en-US" dirty="0"/>
+          </a:p>
+          <a:p>
+            <a:r>
+              <a:rPr lang="en-US" dirty="0"/>
+              <a:t>The </a:t>
+            </a:r>
+            <a:r>
+              <a:rPr lang="en-US" dirty="0" err="1"/>
+              <a:t>VizDimLoadings</a:t>
+            </a:r>
+            <a:r>
+              <a:rPr lang="en-US" dirty="0"/>
+              <a:t> function shows graphs for each PC and the most highly correlated features.</a:t>
+            </a:r>
+          </a:p>
+          <a:p>
+            <a:endParaRPr lang="en-US" dirty="0"/>
+          </a:p>
+        </p:txBody>
+      </p:sp>
+      <p:pic>
+        <p:nvPicPr>
+          <p:cNvPr id="5" name="Picture 4">
+            <a:extLst>
+              <a:ext uri="{FF2B5EF4-FFF2-40B4-BE49-F238E27FC236}">
+                <a16:creationId xmlns:a16="http://schemas.microsoft.com/office/drawing/2014/main" id="{F1EA079C-A4CC-219A-D8F6-4D899BF95A04}"/>
+              </a:ext>
+            </a:extLst>
+          </p:cNvPr>
+          <p:cNvPicPr>
+            <a:picLocks noChangeAspect="1"/>
+          </p:cNvPicPr>
+          <p:nvPr/>
+        </p:nvPicPr>
+        <p:blipFill>
+          <a:blip r:embed="rId2"/>
+          <a:stretch>
+            <a:fillRect/>
+          </a:stretch>
+        </p:blipFill>
+        <p:spPr>
+          <a:xfrm>
+            <a:off x="1143000" y="4162424"/>
+            <a:ext cx="7690908" cy="409575"/>
+          </a:xfrm>
+          <a:prstGeom prst="rect">
+            <a:avLst/>
+          </a:prstGeom>
+        </p:spPr>
+      </p:pic>
     </p:spTree>
     <p:extLst>
       <p:ext uri="{BB962C8B-B14F-4D97-AF65-F5344CB8AC3E}">
-        <p14:creationId xmlns:p14="http://schemas.microsoft.com/office/powerpoint/2010/main" val="732067908"/>
+        <p14:creationId xmlns:p14="http://schemas.microsoft.com/office/powerpoint/2010/main" val="2309164195"/>
       </p:ext>
     </p:extLst>
   </p:cSld>
@@ -3525,6 +3642,140 @@
           <p:cNvPr id="2" name="Title 1">
             <a:extLst>
               <a:ext uri="{FF2B5EF4-FFF2-40B4-BE49-F238E27FC236}">
+                <a16:creationId xmlns:a16="http://schemas.microsoft.com/office/drawing/2014/main" id="{1EFDED0D-05FD-AB0A-BE84-A16E28E591D5}"/>
+              </a:ext>
+            </a:extLst>
+          </p:cNvPr>
+          <p:cNvSpPr>
+            <a:spLocks noGrp="1"/>
+          </p:cNvSpPr>
+          <p:nvPr>
+            <p:ph type="title"/>
+          </p:nvPr>
+        </p:nvSpPr>
+        <p:spPr/>
+        <p:txBody>
+          <a:bodyPr/>
+          <a:lstStyle/>
+          <a:p>
+            <a:r>
+              <a:rPr lang="en-US" dirty="0"/>
+              <a:t>Visualizing PCA (continued)</a:t>
+            </a:r>
+          </a:p>
+        </p:txBody>
+      </p:sp>
+      <p:sp>
+        <p:nvSpPr>
+          <p:cNvPr id="3" name="Content Placeholder 2">
+            <a:extLst>
+              <a:ext uri="{FF2B5EF4-FFF2-40B4-BE49-F238E27FC236}">
+                <a16:creationId xmlns:a16="http://schemas.microsoft.com/office/drawing/2014/main" id="{CAF2F9F6-3B56-9415-533B-A37A891C759A}"/>
+              </a:ext>
+            </a:extLst>
+          </p:cNvPr>
+          <p:cNvSpPr>
+            <a:spLocks noGrp="1"/>
+          </p:cNvSpPr>
+          <p:nvPr>
+            <p:ph idx="1"/>
+          </p:nvPr>
+        </p:nvSpPr>
+        <p:spPr/>
+        <p:txBody>
+          <a:bodyPr/>
+          <a:lstStyle/>
+          <a:p>
+            <a:r>
+              <a:rPr lang="en-US" dirty="0" err="1"/>
+              <a:t>VizDimLoadings</a:t>
+            </a:r>
+            <a:r>
+              <a:rPr lang="en-US" dirty="0"/>
+              <a:t> function shows us the </a:t>
+            </a:r>
+            <a:r>
+              <a:rPr lang="en-US" u="sng" dirty="0"/>
+              <a:t>most highly correlated genes </a:t>
+            </a:r>
+            <a:r>
+              <a:rPr lang="en-US" dirty="0"/>
+              <a:t>with each principal component</a:t>
+            </a:r>
+          </a:p>
+          <a:p>
+            <a:pPr marL="0" indent="0">
+              <a:buNone/>
+            </a:pPr>
+            <a:endParaRPr lang="en-US" dirty="0"/>
+          </a:p>
+        </p:txBody>
+      </p:sp>
+      <p:pic>
+        <p:nvPicPr>
+          <p:cNvPr id="5" name="Picture 4">
+            <a:extLst>
+              <a:ext uri="{FF2B5EF4-FFF2-40B4-BE49-F238E27FC236}">
+                <a16:creationId xmlns:a16="http://schemas.microsoft.com/office/drawing/2014/main" id="{46CD1F12-F2BC-6ECA-135B-D1D4E8FEDD35}"/>
+              </a:ext>
+            </a:extLst>
+          </p:cNvPr>
+          <p:cNvPicPr>
+            <a:picLocks noChangeAspect="1"/>
+          </p:cNvPicPr>
+          <p:nvPr/>
+        </p:nvPicPr>
+        <p:blipFill>
+          <a:blip r:embed="rId2"/>
+          <a:stretch>
+            <a:fillRect/>
+          </a:stretch>
+        </p:blipFill>
+        <p:spPr>
+          <a:xfrm>
+            <a:off x="3052762" y="2755424"/>
+            <a:ext cx="6086475" cy="3626325"/>
+          </a:xfrm>
+          <a:prstGeom prst="rect">
+            <a:avLst/>
+          </a:prstGeom>
+        </p:spPr>
+      </p:pic>
+    </p:spTree>
+    <p:extLst>
+      <p:ext uri="{BB962C8B-B14F-4D97-AF65-F5344CB8AC3E}">
+        <p14:creationId xmlns:p14="http://schemas.microsoft.com/office/powerpoint/2010/main" val="732067908"/>
+      </p:ext>
+    </p:extLst>
+  </p:cSld>
+  <p:clrMapOvr>
+    <a:masterClrMapping/>
+  </p:clrMapOvr>
+</p:sld>
+</file>
+
+<file path=ppt/slides/slide12.xml><?xml version="1.0" encoding="utf-8"?>
+<p:sld xmlns:a="http://schemas.openxmlformats.org/drawingml/2006/main" xmlns:r="http://schemas.openxmlformats.org/officeDocument/2006/relationships" xmlns:p="http://schemas.openxmlformats.org/presentationml/2006/main">
+  <p:cSld>
+    <p:spTree>
+      <p:nvGrpSpPr>
+        <p:cNvPr id="1" name=""/>
+        <p:cNvGrpSpPr/>
+        <p:nvPr/>
+      </p:nvGrpSpPr>
+      <p:grpSpPr>
+        <a:xfrm>
+          <a:off x="0" y="0"/>
+          <a:ext cx="0" cy="0"/>
+          <a:chOff x="0" y="0"/>
+          <a:chExt cx="0" cy="0"/>
+        </a:xfrm>
+      </p:grpSpPr>
+      <p:sp>
+        <p:nvSpPr>
+          <p:cNvPr id="2" name="Title 1">
+            <a:extLst>
+              <a:ext uri="{FF2B5EF4-FFF2-40B4-BE49-F238E27FC236}">
                 <a16:creationId xmlns:a16="http://schemas.microsoft.com/office/drawing/2014/main" id="{07541D69-88CE-43B7-65A3-D60D7240E9A0}"/>
               </a:ext>
             </a:extLst>
@@ -3570,12 +3821,8 @@
           <a:lstStyle/>
           <a:p>
             <a:r>
-              <a:rPr lang="en-US"/>
-              <a:t>Multiple </a:t>
-            </a:r>
-            <a:r>
-              <a:rPr lang="en-US" dirty="0"/>
-              <a:t>different ways:</a:t>
+              <a:rPr lang="en-US" dirty="0"/>
+              <a:t>Multiple different ways:</a:t>
             </a:r>
           </a:p>
           <a:p>
@@ -3604,6 +3851,28 @@
             <a:r>
               <a:rPr lang="en-US" dirty="0"/>
               <a:t>By significance (p-values)</a:t>
+            </a:r>
+          </a:p>
+          <a:p>
+            <a:pPr>
+              <a:buFontTx/>
+              <a:buChar char="-"/>
+            </a:pPr>
+            <a:r>
+              <a:rPr lang="en-US" dirty="0"/>
+              <a:t>Heatmap </a:t>
+            </a:r>
+          </a:p>
+          <a:p>
+            <a:r>
+              <a:rPr lang="en-US" dirty="0"/>
+              <a:t>Dimensionality tells us which PC’s to include for clustering and the UMAP/t-SNE algorithms. </a:t>
+            </a:r>
+          </a:p>
+          <a:p>
+            <a:r>
+              <a:rPr lang="en-US" dirty="0"/>
+              <a:t>By using PCA, we can keep the majority of the variance explained by the dataset but reduce it to less than 5% of it’s original size.</a:t>
             </a:r>
           </a:p>
           <a:p>
@@ -3615,10 +3884,1111 @@
           </a:p>
         </p:txBody>
       </p:sp>
+      <p:pic>
+        <p:nvPicPr>
+          <p:cNvPr id="6" name="Picture 5">
+            <a:extLst>
+              <a:ext uri="{FF2B5EF4-FFF2-40B4-BE49-F238E27FC236}">
+                <a16:creationId xmlns:a16="http://schemas.microsoft.com/office/drawing/2014/main" id="{48CF3A15-F60F-A6BC-8301-A0106956D534}"/>
+              </a:ext>
+            </a:extLst>
+          </p:cNvPr>
+          <p:cNvPicPr>
+            <a:picLocks noChangeAspect="1"/>
+          </p:cNvPicPr>
+          <p:nvPr/>
+        </p:nvPicPr>
+        <p:blipFill>
+          <a:blip r:embed="rId2"/>
+          <a:stretch>
+            <a:fillRect/>
+          </a:stretch>
+        </p:blipFill>
+        <p:spPr>
+          <a:xfrm>
+            <a:off x="5391617" y="3339548"/>
+            <a:ext cx="6667164" cy="359924"/>
+          </a:xfrm>
+          <a:prstGeom prst="rect">
+            <a:avLst/>
+          </a:prstGeom>
+        </p:spPr>
+      </p:pic>
+      <p:pic>
+        <p:nvPicPr>
+          <p:cNvPr id="8" name="Picture 7">
+            <a:extLst>
+              <a:ext uri="{FF2B5EF4-FFF2-40B4-BE49-F238E27FC236}">
+                <a16:creationId xmlns:a16="http://schemas.microsoft.com/office/drawing/2014/main" id="{B17422BB-1FDA-11F8-D7E8-8286A39F4D57}"/>
+              </a:ext>
+            </a:extLst>
+          </p:cNvPr>
+          <p:cNvPicPr>
+            <a:picLocks noChangeAspect="1"/>
+          </p:cNvPicPr>
+          <p:nvPr/>
+        </p:nvPicPr>
+        <p:blipFill>
+          <a:blip r:embed="rId3"/>
+          <a:stretch>
+            <a:fillRect/>
+          </a:stretch>
+        </p:blipFill>
+        <p:spPr>
+          <a:xfrm>
+            <a:off x="5487697" y="2105590"/>
+            <a:ext cx="2547617" cy="571914"/>
+          </a:xfrm>
+          <a:prstGeom prst="rect">
+            <a:avLst/>
+          </a:prstGeom>
+        </p:spPr>
+      </p:pic>
     </p:spTree>
     <p:extLst>
       <p:ext uri="{BB962C8B-B14F-4D97-AF65-F5344CB8AC3E}">
         <p14:creationId xmlns:p14="http://schemas.microsoft.com/office/powerpoint/2010/main" val="3426412610"/>
+      </p:ext>
+    </p:extLst>
+  </p:cSld>
+  <p:clrMapOvr>
+    <a:masterClrMapping/>
+  </p:clrMapOvr>
+</p:sld>
+</file>
+
+<file path=ppt/slides/slide13.xml><?xml version="1.0" encoding="utf-8"?>
+<p:sld xmlns:a="http://schemas.openxmlformats.org/drawingml/2006/main" xmlns:r="http://schemas.openxmlformats.org/officeDocument/2006/relationships" xmlns:p="http://schemas.openxmlformats.org/presentationml/2006/main">
+  <p:cSld>
+    <p:spTree>
+      <p:nvGrpSpPr>
+        <p:cNvPr id="1" name=""/>
+        <p:cNvGrpSpPr/>
+        <p:nvPr/>
+      </p:nvGrpSpPr>
+      <p:grpSpPr>
+        <a:xfrm>
+          <a:off x="0" y="0"/>
+          <a:ext cx="0" cy="0"/>
+          <a:chOff x="0" y="0"/>
+          <a:chExt cx="0" cy="0"/>
+        </a:xfrm>
+      </p:grpSpPr>
+      <p:sp>
+        <p:nvSpPr>
+          <p:cNvPr id="2" name="Title 1">
+            <a:extLst>
+              <a:ext uri="{FF2B5EF4-FFF2-40B4-BE49-F238E27FC236}">
+                <a16:creationId xmlns:a16="http://schemas.microsoft.com/office/drawing/2014/main" id="{0978D98D-F8DC-4583-32F1-D530937BB313}"/>
+              </a:ext>
+            </a:extLst>
+          </p:cNvPr>
+          <p:cNvSpPr>
+            <a:spLocks noGrp="1"/>
+          </p:cNvSpPr>
+          <p:nvPr>
+            <p:ph type="title"/>
+          </p:nvPr>
+        </p:nvSpPr>
+        <p:spPr/>
+        <p:txBody>
+          <a:bodyPr/>
+          <a:lstStyle/>
+          <a:p>
+            <a:r>
+              <a:rPr lang="en-US" dirty="0"/>
+              <a:t>Heatmap</a:t>
+            </a:r>
+            <a:br>
+              <a:rPr lang="en-US" dirty="0"/>
+            </a:br>
+            <a:endParaRPr lang="en-US" dirty="0"/>
+          </a:p>
+        </p:txBody>
+      </p:sp>
+      <p:sp>
+        <p:nvSpPr>
+          <p:cNvPr id="3" name="Content Placeholder 2">
+            <a:extLst>
+              <a:ext uri="{FF2B5EF4-FFF2-40B4-BE49-F238E27FC236}">
+                <a16:creationId xmlns:a16="http://schemas.microsoft.com/office/drawing/2014/main" id="{D565F9E6-D331-F672-2E5D-4BC6AD4B5DCD}"/>
+              </a:ext>
+            </a:extLst>
+          </p:cNvPr>
+          <p:cNvSpPr>
+            <a:spLocks noGrp="1"/>
+          </p:cNvSpPr>
+          <p:nvPr>
+            <p:ph idx="1"/>
+          </p:nvPr>
+        </p:nvSpPr>
+        <p:spPr/>
+        <p:txBody>
+          <a:bodyPr/>
+          <a:lstStyle/>
+          <a:p>
+            <a:r>
+              <a:rPr lang="en-US" dirty="0"/>
+              <a:t>See explanation </a:t>
+            </a:r>
+            <a:r>
+              <a:rPr lang="en-US" dirty="0">
+                <a:hlinkClick r:id="rId2"/>
+              </a:rPr>
+              <a:t>here </a:t>
+            </a:r>
+            <a:r>
+              <a:rPr lang="en-US" dirty="0"/>
+              <a:t>(scroll down to heatmap)</a:t>
+            </a:r>
+          </a:p>
+        </p:txBody>
+      </p:sp>
+      <p:pic>
+        <p:nvPicPr>
+          <p:cNvPr id="5" name="Picture 4">
+            <a:extLst>
+              <a:ext uri="{FF2B5EF4-FFF2-40B4-BE49-F238E27FC236}">
+                <a16:creationId xmlns:a16="http://schemas.microsoft.com/office/drawing/2014/main" id="{F9EFF32F-D19B-1271-C311-80D7919AAC70}"/>
+              </a:ext>
+            </a:extLst>
+          </p:cNvPr>
+          <p:cNvPicPr>
+            <a:picLocks noChangeAspect="1"/>
+          </p:cNvPicPr>
+          <p:nvPr/>
+        </p:nvPicPr>
+        <p:blipFill>
+          <a:blip r:embed="rId3"/>
+          <a:stretch>
+            <a:fillRect/>
+          </a:stretch>
+        </p:blipFill>
+        <p:spPr>
+          <a:xfrm>
+            <a:off x="1400175" y="2243246"/>
+            <a:ext cx="9005887" cy="4249629"/>
+          </a:xfrm>
+          <a:prstGeom prst="rect">
+            <a:avLst/>
+          </a:prstGeom>
+        </p:spPr>
+      </p:pic>
+      <p:pic>
+        <p:nvPicPr>
+          <p:cNvPr id="7" name="Picture 6">
+            <a:extLst>
+              <a:ext uri="{FF2B5EF4-FFF2-40B4-BE49-F238E27FC236}">
+                <a16:creationId xmlns:a16="http://schemas.microsoft.com/office/drawing/2014/main" id="{F01A1846-864C-B257-9F1F-0F32F5630735}"/>
+              </a:ext>
+            </a:extLst>
+          </p:cNvPr>
+          <p:cNvPicPr>
+            <a:picLocks noChangeAspect="1"/>
+          </p:cNvPicPr>
+          <p:nvPr/>
+        </p:nvPicPr>
+        <p:blipFill>
+          <a:blip r:embed="rId4"/>
+          <a:stretch>
+            <a:fillRect/>
+          </a:stretch>
+        </p:blipFill>
+        <p:spPr>
+          <a:xfrm>
+            <a:off x="4243387" y="3328987"/>
+            <a:ext cx="3705225" cy="200025"/>
+          </a:xfrm>
+          <a:prstGeom prst="rect">
+            <a:avLst/>
+          </a:prstGeom>
+        </p:spPr>
+      </p:pic>
+      <p:pic>
+        <p:nvPicPr>
+          <p:cNvPr id="9" name="Picture 8">
+            <a:extLst>
+              <a:ext uri="{FF2B5EF4-FFF2-40B4-BE49-F238E27FC236}">
+                <a16:creationId xmlns:a16="http://schemas.microsoft.com/office/drawing/2014/main" id="{06CBBD7C-46A1-64C0-7276-F7FC6B4C5B17}"/>
+              </a:ext>
+            </a:extLst>
+          </p:cNvPr>
+          <p:cNvPicPr>
+            <a:picLocks noChangeAspect="1"/>
+          </p:cNvPicPr>
+          <p:nvPr/>
+        </p:nvPicPr>
+        <p:blipFill>
+          <a:blip r:embed="rId4"/>
+          <a:stretch>
+            <a:fillRect/>
+          </a:stretch>
+        </p:blipFill>
+        <p:spPr>
+          <a:xfrm>
+            <a:off x="4243387" y="3328987"/>
+            <a:ext cx="3705225" cy="200025"/>
+          </a:xfrm>
+          <a:prstGeom prst="rect">
+            <a:avLst/>
+          </a:prstGeom>
+        </p:spPr>
+      </p:pic>
+    </p:spTree>
+    <p:extLst>
+      <p:ext uri="{BB962C8B-B14F-4D97-AF65-F5344CB8AC3E}">
+        <p14:creationId xmlns:p14="http://schemas.microsoft.com/office/powerpoint/2010/main" val="106221635"/>
+      </p:ext>
+    </p:extLst>
+  </p:cSld>
+  <p:clrMapOvr>
+    <a:masterClrMapping/>
+  </p:clrMapOvr>
+</p:sld>
+</file>
+
+<file path=ppt/slides/slide14.xml><?xml version="1.0" encoding="utf-8"?>
+<p:sld xmlns:a="http://schemas.openxmlformats.org/drawingml/2006/main" xmlns:r="http://schemas.openxmlformats.org/officeDocument/2006/relationships" xmlns:p="http://schemas.openxmlformats.org/presentationml/2006/main">
+  <p:cSld>
+    <p:spTree>
+      <p:nvGrpSpPr>
+        <p:cNvPr id="1" name=""/>
+        <p:cNvGrpSpPr/>
+        <p:nvPr/>
+      </p:nvGrpSpPr>
+      <p:grpSpPr>
+        <a:xfrm>
+          <a:off x="0" y="0"/>
+          <a:ext cx="0" cy="0"/>
+          <a:chOff x="0" y="0"/>
+          <a:chExt cx="0" cy="0"/>
+        </a:xfrm>
+      </p:grpSpPr>
+      <p:sp>
+        <p:nvSpPr>
+          <p:cNvPr id="2" name="Title 1">
+            <a:extLst>
+              <a:ext uri="{FF2B5EF4-FFF2-40B4-BE49-F238E27FC236}">
+                <a16:creationId xmlns:a16="http://schemas.microsoft.com/office/drawing/2014/main" id="{613F3854-C979-1CB9-C007-4AB5747E4C07}"/>
+              </a:ext>
+            </a:extLst>
+          </p:cNvPr>
+          <p:cNvSpPr>
+            <a:spLocks noGrp="1"/>
+          </p:cNvSpPr>
+          <p:nvPr>
+            <p:ph type="title"/>
+          </p:nvPr>
+        </p:nvSpPr>
+        <p:spPr/>
+        <p:txBody>
+          <a:bodyPr/>
+          <a:lstStyle/>
+          <a:p>
+            <a:r>
+              <a:rPr lang="en-US" dirty="0"/>
+              <a:t>Elbow Plot</a:t>
+            </a:r>
+          </a:p>
+        </p:txBody>
+      </p:sp>
+      <p:sp>
+        <p:nvSpPr>
+          <p:cNvPr id="3" name="Content Placeholder 2">
+            <a:extLst>
+              <a:ext uri="{FF2B5EF4-FFF2-40B4-BE49-F238E27FC236}">
+                <a16:creationId xmlns:a16="http://schemas.microsoft.com/office/drawing/2014/main" id="{1374F199-FE83-FE86-1F18-CD37A52AB7B2}"/>
+              </a:ext>
+            </a:extLst>
+          </p:cNvPr>
+          <p:cNvSpPr>
+            <a:spLocks noGrp="1"/>
+          </p:cNvSpPr>
+          <p:nvPr>
+            <p:ph idx="1"/>
+          </p:nvPr>
+        </p:nvSpPr>
+        <p:spPr/>
+        <p:txBody>
+          <a:bodyPr/>
+          <a:lstStyle/>
+          <a:p>
+            <a:r>
+              <a:rPr lang="en-US" dirty="0"/>
+              <a:t>Heuristic: choose # of PC’s before the “bend” of the elbow</a:t>
+            </a:r>
+          </a:p>
+          <a:p>
+            <a:r>
+              <a:rPr lang="en-US" dirty="0"/>
+              <a:t>Based on this plot, choose between 10-15 PC’s</a:t>
+            </a:r>
+          </a:p>
+          <a:p>
+            <a:pPr marL="0" indent="0">
+              <a:buNone/>
+            </a:pPr>
+            <a:endParaRPr lang="en-US" dirty="0"/>
+          </a:p>
+          <a:p>
+            <a:pPr marL="0" indent="0">
+              <a:buNone/>
+            </a:pPr>
+            <a:endParaRPr lang="en-US" dirty="0"/>
+          </a:p>
+        </p:txBody>
+      </p:sp>
+      <p:pic>
+        <p:nvPicPr>
+          <p:cNvPr id="5" name="Picture 4">
+            <a:extLst>
+              <a:ext uri="{FF2B5EF4-FFF2-40B4-BE49-F238E27FC236}">
+                <a16:creationId xmlns:a16="http://schemas.microsoft.com/office/drawing/2014/main" id="{5C0E4F2C-E76E-CB5C-6BE6-20466E9A6A91}"/>
+              </a:ext>
+            </a:extLst>
+          </p:cNvPr>
+          <p:cNvPicPr>
+            <a:picLocks noChangeAspect="1"/>
+          </p:cNvPicPr>
+          <p:nvPr/>
+        </p:nvPicPr>
+        <p:blipFill>
+          <a:blip r:embed="rId2"/>
+          <a:stretch>
+            <a:fillRect/>
+          </a:stretch>
+        </p:blipFill>
+        <p:spPr>
+          <a:xfrm>
+            <a:off x="3061252" y="3197779"/>
+            <a:ext cx="5853113" cy="3521073"/>
+          </a:xfrm>
+          <a:prstGeom prst="rect">
+            <a:avLst/>
+          </a:prstGeom>
+        </p:spPr>
+      </p:pic>
+    </p:spTree>
+    <p:extLst>
+      <p:ext uri="{BB962C8B-B14F-4D97-AF65-F5344CB8AC3E}">
+        <p14:creationId xmlns:p14="http://schemas.microsoft.com/office/powerpoint/2010/main" val="1785347984"/>
+      </p:ext>
+    </p:extLst>
+  </p:cSld>
+  <p:clrMapOvr>
+    <a:masterClrMapping/>
+  </p:clrMapOvr>
+</p:sld>
+</file>
+
+<file path=ppt/slides/slide15.xml><?xml version="1.0" encoding="utf-8"?>
+<p:sld xmlns:a="http://schemas.openxmlformats.org/drawingml/2006/main" xmlns:r="http://schemas.openxmlformats.org/officeDocument/2006/relationships" xmlns:p="http://schemas.openxmlformats.org/presentationml/2006/main">
+  <p:cSld>
+    <p:spTree>
+      <p:nvGrpSpPr>
+        <p:cNvPr id="1" name=""/>
+        <p:cNvGrpSpPr/>
+        <p:nvPr/>
+      </p:nvGrpSpPr>
+      <p:grpSpPr>
+        <a:xfrm>
+          <a:off x="0" y="0"/>
+          <a:ext cx="0" cy="0"/>
+          <a:chOff x="0" y="0"/>
+          <a:chExt cx="0" cy="0"/>
+        </a:xfrm>
+      </p:grpSpPr>
+      <p:sp>
+        <p:nvSpPr>
+          <p:cNvPr id="2" name="Title 1">
+            <a:extLst>
+              <a:ext uri="{FF2B5EF4-FFF2-40B4-BE49-F238E27FC236}">
+                <a16:creationId xmlns:a16="http://schemas.microsoft.com/office/drawing/2014/main" id="{2DEBB1AE-2BDA-E2B3-12DE-23C4375EDA08}"/>
+              </a:ext>
+            </a:extLst>
+          </p:cNvPr>
+          <p:cNvSpPr>
+            <a:spLocks noGrp="1"/>
+          </p:cNvSpPr>
+          <p:nvPr>
+            <p:ph type="title"/>
+          </p:nvPr>
+        </p:nvSpPr>
+        <p:spPr/>
+        <p:txBody>
+          <a:bodyPr/>
+          <a:lstStyle/>
+          <a:p>
+            <a:r>
+              <a:rPr lang="en-US" dirty="0"/>
+              <a:t>UMAP w/ 15 &amp; 20 PCs</a:t>
+            </a:r>
+          </a:p>
+        </p:txBody>
+      </p:sp>
+      <p:pic>
+        <p:nvPicPr>
+          <p:cNvPr id="5" name="Content Placeholder 4">
+            <a:extLst>
+              <a:ext uri="{FF2B5EF4-FFF2-40B4-BE49-F238E27FC236}">
+                <a16:creationId xmlns:a16="http://schemas.microsoft.com/office/drawing/2014/main" id="{B865A936-80AE-33BD-CB32-EC1ADB17FE91}"/>
+              </a:ext>
+            </a:extLst>
+          </p:cNvPr>
+          <p:cNvPicPr>
+            <a:picLocks noGrp="1" noChangeAspect="1"/>
+          </p:cNvPicPr>
+          <p:nvPr>
+            <p:ph idx="1"/>
+          </p:nvPr>
+        </p:nvPicPr>
+        <p:blipFill>
+          <a:blip r:embed="rId2"/>
+          <a:stretch>
+            <a:fillRect/>
+          </a:stretch>
+        </p:blipFill>
+        <p:spPr>
+          <a:xfrm>
+            <a:off x="209964" y="1586085"/>
+            <a:ext cx="5981863" cy="3542506"/>
+          </a:xfrm>
+        </p:spPr>
+      </p:pic>
+      <p:pic>
+        <p:nvPicPr>
+          <p:cNvPr id="7" name="Picture 6">
+            <a:extLst>
+              <a:ext uri="{FF2B5EF4-FFF2-40B4-BE49-F238E27FC236}">
+                <a16:creationId xmlns:a16="http://schemas.microsoft.com/office/drawing/2014/main" id="{617AC525-095F-0B51-AD75-142F17F882A3}"/>
+              </a:ext>
+            </a:extLst>
+          </p:cNvPr>
+          <p:cNvPicPr>
+            <a:picLocks noChangeAspect="1"/>
+          </p:cNvPicPr>
+          <p:nvPr/>
+        </p:nvPicPr>
+        <p:blipFill>
+          <a:blip r:embed="rId3"/>
+          <a:stretch>
+            <a:fillRect/>
+          </a:stretch>
+        </p:blipFill>
+        <p:spPr>
+          <a:xfrm>
+            <a:off x="6191827" y="1586085"/>
+            <a:ext cx="5917068" cy="3542506"/>
+          </a:xfrm>
+          <a:prstGeom prst="rect">
+            <a:avLst/>
+          </a:prstGeom>
+        </p:spPr>
+      </p:pic>
+      <p:sp>
+        <p:nvSpPr>
+          <p:cNvPr id="8" name="TextBox 7">
+            <a:extLst>
+              <a:ext uri="{FF2B5EF4-FFF2-40B4-BE49-F238E27FC236}">
+                <a16:creationId xmlns:a16="http://schemas.microsoft.com/office/drawing/2014/main" id="{BC091833-78AB-5CB5-DCDA-6F14803F429B}"/>
+              </a:ext>
+            </a:extLst>
+          </p:cNvPr>
+          <p:cNvSpPr txBox="1"/>
+          <p:nvPr/>
+        </p:nvSpPr>
+        <p:spPr>
+          <a:xfrm>
+            <a:off x="657225" y="5128591"/>
+            <a:ext cx="11051071" cy="1200329"/>
+          </a:xfrm>
+          <a:prstGeom prst="rect">
+            <a:avLst/>
+          </a:prstGeom>
+          <a:noFill/>
+        </p:spPr>
+        <p:txBody>
+          <a:bodyPr wrap="square" rtlCol="0">
+            <a:spAutoFit/>
+          </a:bodyPr>
+          <a:lstStyle/>
+          <a:p>
+            <a:pPr marL="285750" indent="-285750">
+              <a:buFont typeface="Arial" panose="020B0604020202020204" pitchFamily="34" charset="0"/>
+              <a:buChar char="•"/>
+            </a:pPr>
+            <a:r>
+              <a:rPr lang="en-US" dirty="0"/>
+              <a:t>Main difference: in the graph using 20 PCs (right), we have one more cluster (light pink, middle-top of screen)</a:t>
+            </a:r>
+          </a:p>
+          <a:p>
+            <a:pPr marL="285750" indent="-285750">
+              <a:buFont typeface="Arial" panose="020B0604020202020204" pitchFamily="34" charset="0"/>
+              <a:buChar char="•"/>
+            </a:pPr>
+            <a:r>
+              <a:rPr lang="en-US" dirty="0"/>
+              <a:t>Otherwise, the visualization and also the clustering is relatively similar </a:t>
+            </a:r>
+          </a:p>
+          <a:p>
+            <a:pPr marL="285750" indent="-285750">
+              <a:buFont typeface="Arial" panose="020B0604020202020204" pitchFamily="34" charset="0"/>
+              <a:buChar char="•"/>
+            </a:pPr>
+            <a:r>
+              <a:rPr lang="en-US" dirty="0"/>
+              <a:t>Note one image is a mirror of the other!</a:t>
+            </a:r>
+          </a:p>
+          <a:p>
+            <a:endParaRPr lang="en-US" dirty="0"/>
+          </a:p>
+        </p:txBody>
+      </p:sp>
+    </p:spTree>
+    <p:extLst>
+      <p:ext uri="{BB962C8B-B14F-4D97-AF65-F5344CB8AC3E}">
+        <p14:creationId xmlns:p14="http://schemas.microsoft.com/office/powerpoint/2010/main" val="2294225328"/>
+      </p:ext>
+    </p:extLst>
+  </p:cSld>
+  <p:clrMapOvr>
+    <a:masterClrMapping/>
+  </p:clrMapOvr>
+</p:sld>
+</file>
+
+<file path=ppt/slides/slide16.xml><?xml version="1.0" encoding="utf-8"?>
+<p:sld xmlns:a="http://schemas.openxmlformats.org/drawingml/2006/main" xmlns:r="http://schemas.openxmlformats.org/officeDocument/2006/relationships" xmlns:p="http://schemas.openxmlformats.org/presentationml/2006/main">
+  <p:cSld>
+    <p:spTree>
+      <p:nvGrpSpPr>
+        <p:cNvPr id="1" name=""/>
+        <p:cNvGrpSpPr/>
+        <p:nvPr/>
+      </p:nvGrpSpPr>
+      <p:grpSpPr>
+        <a:xfrm>
+          <a:off x="0" y="0"/>
+          <a:ext cx="0" cy="0"/>
+          <a:chOff x="0" y="0"/>
+          <a:chExt cx="0" cy="0"/>
+        </a:xfrm>
+      </p:grpSpPr>
+      <p:sp>
+        <p:nvSpPr>
+          <p:cNvPr id="2" name="Title 1">
+            <a:extLst>
+              <a:ext uri="{FF2B5EF4-FFF2-40B4-BE49-F238E27FC236}">
+                <a16:creationId xmlns:a16="http://schemas.microsoft.com/office/drawing/2014/main" id="{A32091FE-E26B-919C-837A-C2818DA5DD3F}"/>
+              </a:ext>
+            </a:extLst>
+          </p:cNvPr>
+          <p:cNvSpPr>
+            <a:spLocks noGrp="1"/>
+          </p:cNvSpPr>
+          <p:nvPr>
+            <p:ph type="title"/>
+          </p:nvPr>
+        </p:nvSpPr>
+        <p:spPr/>
+        <p:txBody>
+          <a:bodyPr/>
+          <a:lstStyle/>
+          <a:p>
+            <a:r>
+              <a:rPr lang="en-US" dirty="0"/>
+              <a:t>UMAP w/ 5 and 10 PC’s – start with 10 Pc’s </a:t>
+            </a:r>
+          </a:p>
+        </p:txBody>
+      </p:sp>
+      <p:pic>
+        <p:nvPicPr>
+          <p:cNvPr id="5" name="Content Placeholder 4">
+            <a:extLst>
+              <a:ext uri="{FF2B5EF4-FFF2-40B4-BE49-F238E27FC236}">
+                <a16:creationId xmlns:a16="http://schemas.microsoft.com/office/drawing/2014/main" id="{6099B22C-9EDD-DE49-2F72-657C8B177D8B}"/>
+              </a:ext>
+            </a:extLst>
+          </p:cNvPr>
+          <p:cNvPicPr>
+            <a:picLocks noGrp="1" noChangeAspect="1"/>
+          </p:cNvPicPr>
+          <p:nvPr>
+            <p:ph idx="1"/>
+          </p:nvPr>
+        </p:nvPicPr>
+        <p:blipFill>
+          <a:blip r:embed="rId2"/>
+          <a:stretch>
+            <a:fillRect/>
+          </a:stretch>
+        </p:blipFill>
+        <p:spPr>
+          <a:xfrm>
+            <a:off x="6685722" y="1664572"/>
+            <a:ext cx="4668078" cy="2759244"/>
+          </a:xfrm>
+        </p:spPr>
+      </p:pic>
+      <p:pic>
+        <p:nvPicPr>
+          <p:cNvPr id="7" name="Picture 6">
+            <a:extLst>
+              <a:ext uri="{FF2B5EF4-FFF2-40B4-BE49-F238E27FC236}">
+                <a16:creationId xmlns:a16="http://schemas.microsoft.com/office/drawing/2014/main" id="{C766747D-6AD3-21DA-28C2-CF43903512DF}"/>
+              </a:ext>
+            </a:extLst>
+          </p:cNvPr>
+          <p:cNvPicPr>
+            <a:picLocks noChangeAspect="1"/>
+          </p:cNvPicPr>
+          <p:nvPr/>
+        </p:nvPicPr>
+        <p:blipFill>
+          <a:blip r:embed="rId3"/>
+          <a:stretch>
+            <a:fillRect/>
+          </a:stretch>
+        </p:blipFill>
+        <p:spPr>
+          <a:xfrm>
+            <a:off x="838200" y="1803311"/>
+            <a:ext cx="5072270" cy="2481766"/>
+          </a:xfrm>
+          <a:prstGeom prst="rect">
+            <a:avLst/>
+          </a:prstGeom>
+        </p:spPr>
+      </p:pic>
+      <p:sp>
+        <p:nvSpPr>
+          <p:cNvPr id="8" name="TextBox 7">
+            <a:extLst>
+              <a:ext uri="{FF2B5EF4-FFF2-40B4-BE49-F238E27FC236}">
+                <a16:creationId xmlns:a16="http://schemas.microsoft.com/office/drawing/2014/main" id="{A0872728-2631-4726-21B3-9B6AA900A2F6}"/>
+              </a:ext>
+            </a:extLst>
+          </p:cNvPr>
+          <p:cNvSpPr txBox="1"/>
+          <p:nvPr/>
+        </p:nvSpPr>
+        <p:spPr>
+          <a:xfrm>
+            <a:off x="838200" y="4581940"/>
+            <a:ext cx="10515600" cy="1200329"/>
+          </a:xfrm>
+          <a:prstGeom prst="rect">
+            <a:avLst/>
+          </a:prstGeom>
+          <a:noFill/>
+        </p:spPr>
+        <p:txBody>
+          <a:bodyPr wrap="square" rtlCol="0">
+            <a:spAutoFit/>
+          </a:bodyPr>
+          <a:lstStyle/>
+          <a:p>
+            <a:pPr marL="285750" indent="-285750">
+              <a:buFont typeface="Arial" panose="020B0604020202020204" pitchFamily="34" charset="0"/>
+              <a:buChar char="•"/>
+            </a:pPr>
+            <a:r>
+              <a:rPr lang="en-US" dirty="0"/>
+              <a:t>There is a larger difference between using 5 and 10 PC’s than there is using 15 and 20 PC’s. This is to be expected, as the PC’s 6-10 account for a higher percentage of explained variance than 16-20.</a:t>
+            </a:r>
+          </a:p>
+          <a:p>
+            <a:pPr marL="285750" indent="-285750">
+              <a:buFont typeface="Arial" panose="020B0604020202020204" pitchFamily="34" charset="0"/>
+              <a:buChar char="•"/>
+            </a:pPr>
+            <a:r>
+              <a:rPr lang="en-US" dirty="0"/>
+              <a:t>That said, some underlying structure remains preserved. Note there are two clusters on the right and 6 other ones on the left, with some space in between. </a:t>
+            </a:r>
+          </a:p>
+        </p:txBody>
+      </p:sp>
+    </p:spTree>
+    <p:extLst>
+      <p:ext uri="{BB962C8B-B14F-4D97-AF65-F5344CB8AC3E}">
+        <p14:creationId xmlns:p14="http://schemas.microsoft.com/office/powerpoint/2010/main" val="3485514208"/>
+      </p:ext>
+    </p:extLst>
+  </p:cSld>
+  <p:clrMapOvr>
+    <a:masterClrMapping/>
+  </p:clrMapOvr>
+</p:sld>
+</file>
+
+<file path=ppt/slides/slide17.xml><?xml version="1.0" encoding="utf-8"?>
+<p:sld xmlns:a="http://schemas.openxmlformats.org/drawingml/2006/main" xmlns:r="http://schemas.openxmlformats.org/officeDocument/2006/relationships" xmlns:p="http://schemas.openxmlformats.org/presentationml/2006/main">
+  <p:cSld>
+    <p:spTree>
+      <p:nvGrpSpPr>
+        <p:cNvPr id="1" name=""/>
+        <p:cNvGrpSpPr/>
+        <p:nvPr/>
+      </p:nvGrpSpPr>
+      <p:grpSpPr>
+        <a:xfrm>
+          <a:off x="0" y="0"/>
+          <a:ext cx="0" cy="0"/>
+          <a:chOff x="0" y="0"/>
+          <a:chExt cx="0" cy="0"/>
+        </a:xfrm>
+      </p:grpSpPr>
+      <p:sp>
+        <p:nvSpPr>
+          <p:cNvPr id="2" name="Title 1">
+            <a:extLst>
+              <a:ext uri="{FF2B5EF4-FFF2-40B4-BE49-F238E27FC236}">
+                <a16:creationId xmlns:a16="http://schemas.microsoft.com/office/drawing/2014/main" id="{333E67B4-B0B7-09C9-792F-6FBF0E38E8AE}"/>
+              </a:ext>
+            </a:extLst>
+          </p:cNvPr>
+          <p:cNvSpPr>
+            <a:spLocks noGrp="1"/>
+          </p:cNvSpPr>
+          <p:nvPr>
+            <p:ph type="title"/>
+          </p:nvPr>
+        </p:nvSpPr>
+        <p:spPr/>
+        <p:txBody>
+          <a:bodyPr/>
+          <a:lstStyle/>
+          <a:p>
+            <a:r>
+              <a:rPr lang="en-US" dirty="0"/>
+              <a:t>Using 9-12 PC’s: very similar representations</a:t>
+            </a:r>
+          </a:p>
+        </p:txBody>
+      </p:sp>
+      <p:sp>
+        <p:nvSpPr>
+          <p:cNvPr id="3" name="Content Placeholder 2">
+            <a:extLst>
+              <a:ext uri="{FF2B5EF4-FFF2-40B4-BE49-F238E27FC236}">
+                <a16:creationId xmlns:a16="http://schemas.microsoft.com/office/drawing/2014/main" id="{E7C5A1CB-744D-66FF-1AD0-FCD61F0C3816}"/>
+              </a:ext>
+            </a:extLst>
+          </p:cNvPr>
+          <p:cNvSpPr>
+            <a:spLocks noGrp="1"/>
+          </p:cNvSpPr>
+          <p:nvPr>
+            <p:ph idx="1"/>
+          </p:nvPr>
+        </p:nvSpPr>
+        <p:spPr>
+          <a:xfrm>
+            <a:off x="838200" y="1570383"/>
+            <a:ext cx="10515600" cy="5059018"/>
+          </a:xfrm>
+        </p:spPr>
+        <p:txBody>
+          <a:bodyPr/>
+          <a:lstStyle/>
+          <a:p>
+            <a:r>
+              <a:rPr lang="en-US" dirty="0"/>
+              <a:t>Why this many?  </a:t>
+            </a:r>
+            <a:r>
+              <a:rPr lang="en-US" dirty="0">
+                <a:sym typeface="Wingdings" panose="05000000000000000000" pitchFamily="2" charset="2"/>
+              </a:rPr>
+              <a:t> Elbow Plot heuristic!</a:t>
+            </a:r>
+          </a:p>
+          <a:p>
+            <a:endParaRPr lang="en-US" dirty="0">
+              <a:sym typeface="Wingdings" panose="05000000000000000000" pitchFamily="2" charset="2"/>
+            </a:endParaRPr>
+          </a:p>
+          <a:p>
+            <a:endParaRPr lang="en-US" dirty="0">
+              <a:sym typeface="Wingdings" panose="05000000000000000000" pitchFamily="2" charset="2"/>
+            </a:endParaRPr>
+          </a:p>
+          <a:p>
+            <a:endParaRPr lang="en-US" dirty="0">
+              <a:sym typeface="Wingdings" panose="05000000000000000000" pitchFamily="2" charset="2"/>
+            </a:endParaRPr>
+          </a:p>
+          <a:p>
+            <a:endParaRPr lang="en-US" dirty="0">
+              <a:sym typeface="Wingdings" panose="05000000000000000000" pitchFamily="2" charset="2"/>
+            </a:endParaRPr>
+          </a:p>
+          <a:p>
+            <a:endParaRPr lang="en-US" dirty="0">
+              <a:sym typeface="Wingdings" panose="05000000000000000000" pitchFamily="2" charset="2"/>
+            </a:endParaRPr>
+          </a:p>
+          <a:p>
+            <a:pPr marL="0" indent="0">
+              <a:buNone/>
+            </a:pPr>
+            <a:r>
+              <a:rPr lang="en-US" dirty="0">
+                <a:sym typeface="Wingdings" panose="05000000000000000000" pitchFamily="2" charset="2"/>
+              </a:rPr>
+              <a:t>			</a:t>
+            </a:r>
+            <a:r>
+              <a:rPr lang="en-US" sz="1400" dirty="0">
+                <a:sym typeface="Wingdings" panose="05000000000000000000" pitchFamily="2" charset="2"/>
+              </a:rPr>
+              <a:t>                                                                                                                                      </a:t>
+            </a:r>
+            <a:endParaRPr lang="en-US" dirty="0">
+              <a:sym typeface="Wingdings" panose="05000000000000000000" pitchFamily="2" charset="2"/>
+            </a:endParaRPr>
+          </a:p>
+          <a:p>
+            <a:endParaRPr lang="en-US" dirty="0"/>
+          </a:p>
+          <a:p>
+            <a:endParaRPr lang="en-US" dirty="0"/>
+          </a:p>
+          <a:p>
+            <a:endParaRPr lang="en-US" dirty="0"/>
+          </a:p>
+          <a:p>
+            <a:endParaRPr lang="en-US" dirty="0"/>
+          </a:p>
+          <a:p>
+            <a:pPr marL="2286000" lvl="5" indent="0">
+              <a:buNone/>
+            </a:pPr>
+            <a:endParaRPr lang="en-US" dirty="0"/>
+          </a:p>
+        </p:txBody>
+      </p:sp>
+      <p:pic>
+        <p:nvPicPr>
+          <p:cNvPr id="5" name="Picture 4">
+            <a:extLst>
+              <a:ext uri="{FF2B5EF4-FFF2-40B4-BE49-F238E27FC236}">
+                <a16:creationId xmlns:a16="http://schemas.microsoft.com/office/drawing/2014/main" id="{4D19C13E-2050-44CF-9451-83920AB0A11A}"/>
+              </a:ext>
+            </a:extLst>
+          </p:cNvPr>
+          <p:cNvPicPr>
+            <a:picLocks noChangeAspect="1"/>
+          </p:cNvPicPr>
+          <p:nvPr/>
+        </p:nvPicPr>
+        <p:blipFill>
+          <a:blip r:embed="rId2"/>
+          <a:stretch>
+            <a:fillRect/>
+          </a:stretch>
+        </p:blipFill>
+        <p:spPr>
+          <a:xfrm>
+            <a:off x="1461052" y="2178886"/>
+            <a:ext cx="4345263" cy="2104652"/>
+          </a:xfrm>
+          <a:prstGeom prst="rect">
+            <a:avLst/>
+          </a:prstGeom>
+        </p:spPr>
+      </p:pic>
+      <p:pic>
+        <p:nvPicPr>
+          <p:cNvPr id="6" name="Content Placeholder 4">
+            <a:extLst>
+              <a:ext uri="{FF2B5EF4-FFF2-40B4-BE49-F238E27FC236}">
+                <a16:creationId xmlns:a16="http://schemas.microsoft.com/office/drawing/2014/main" id="{7CC05CAB-714D-A83F-87E4-335C87C63015}"/>
+              </a:ext>
+            </a:extLst>
+          </p:cNvPr>
+          <p:cNvPicPr>
+            <a:picLocks noChangeAspect="1"/>
+          </p:cNvPicPr>
+          <p:nvPr/>
+        </p:nvPicPr>
+        <p:blipFill>
+          <a:blip r:embed="rId3"/>
+          <a:stretch>
+            <a:fillRect/>
+          </a:stretch>
+        </p:blipFill>
+        <p:spPr>
+          <a:xfrm>
+            <a:off x="7132256" y="1999438"/>
+            <a:ext cx="3830603" cy="2264222"/>
+          </a:xfrm>
+          <a:prstGeom prst="rect">
+            <a:avLst/>
+          </a:prstGeom>
+        </p:spPr>
+      </p:pic>
+      <p:pic>
+        <p:nvPicPr>
+          <p:cNvPr id="8" name="Picture 7">
+            <a:extLst>
+              <a:ext uri="{FF2B5EF4-FFF2-40B4-BE49-F238E27FC236}">
+                <a16:creationId xmlns:a16="http://schemas.microsoft.com/office/drawing/2014/main" id="{56660CA3-7670-8D6C-3A60-F5FF322D624D}"/>
+              </a:ext>
+            </a:extLst>
+          </p:cNvPr>
+          <p:cNvPicPr>
+            <a:picLocks noChangeAspect="1"/>
+          </p:cNvPicPr>
+          <p:nvPr/>
+        </p:nvPicPr>
+        <p:blipFill>
+          <a:blip r:embed="rId4"/>
+          <a:stretch>
+            <a:fillRect/>
+          </a:stretch>
+        </p:blipFill>
+        <p:spPr>
+          <a:xfrm>
+            <a:off x="1548123" y="4731980"/>
+            <a:ext cx="4171122" cy="1991711"/>
+          </a:xfrm>
+          <a:prstGeom prst="rect">
+            <a:avLst/>
+          </a:prstGeom>
+        </p:spPr>
+      </p:pic>
+      <p:pic>
+        <p:nvPicPr>
+          <p:cNvPr id="12" name="Picture 11">
+            <a:extLst>
+              <a:ext uri="{FF2B5EF4-FFF2-40B4-BE49-F238E27FC236}">
+                <a16:creationId xmlns:a16="http://schemas.microsoft.com/office/drawing/2014/main" id="{B1396B03-3457-6FAE-F2AE-4BADD385EACC}"/>
+              </a:ext>
+            </a:extLst>
+          </p:cNvPr>
+          <p:cNvPicPr>
+            <a:picLocks noChangeAspect="1"/>
+          </p:cNvPicPr>
+          <p:nvPr/>
+        </p:nvPicPr>
+        <p:blipFill>
+          <a:blip r:embed="rId5"/>
+          <a:stretch>
+            <a:fillRect/>
+          </a:stretch>
+        </p:blipFill>
+        <p:spPr>
+          <a:xfrm>
+            <a:off x="7132256" y="4731980"/>
+            <a:ext cx="3830603" cy="1854614"/>
+          </a:xfrm>
+          <a:prstGeom prst="rect">
+            <a:avLst/>
+          </a:prstGeom>
+        </p:spPr>
+      </p:pic>
+    </p:spTree>
+    <p:extLst>
+      <p:ext uri="{BB962C8B-B14F-4D97-AF65-F5344CB8AC3E}">
+        <p14:creationId xmlns:p14="http://schemas.microsoft.com/office/powerpoint/2010/main" val="3219490298"/>
+      </p:ext>
+    </p:extLst>
+  </p:cSld>
+  <p:clrMapOvr>
+    <a:masterClrMapping/>
+  </p:clrMapOvr>
+</p:sld>
+</file>
+
+<file path=ppt/slides/slide18.xml><?xml version="1.0" encoding="utf-8"?>
+<p:sld xmlns:a="http://schemas.openxmlformats.org/drawingml/2006/main" xmlns:r="http://schemas.openxmlformats.org/officeDocument/2006/relationships" xmlns:p="http://schemas.openxmlformats.org/presentationml/2006/main">
+  <p:cSld>
+    <p:spTree>
+      <p:nvGrpSpPr>
+        <p:cNvPr id="1" name=""/>
+        <p:cNvGrpSpPr/>
+        <p:nvPr/>
+      </p:nvGrpSpPr>
+      <p:grpSpPr>
+        <a:xfrm>
+          <a:off x="0" y="0"/>
+          <a:ext cx="0" cy="0"/>
+          <a:chOff x="0" y="0"/>
+          <a:chExt cx="0" cy="0"/>
+        </a:xfrm>
+      </p:grpSpPr>
+      <p:sp>
+        <p:nvSpPr>
+          <p:cNvPr id="2" name="Title 1">
+            <a:extLst>
+              <a:ext uri="{FF2B5EF4-FFF2-40B4-BE49-F238E27FC236}">
+                <a16:creationId xmlns:a16="http://schemas.microsoft.com/office/drawing/2014/main" id="{AF6B9678-EC3D-5B20-478B-F3B76D675C35}"/>
+              </a:ext>
+            </a:extLst>
+          </p:cNvPr>
+          <p:cNvSpPr>
+            <a:spLocks noGrp="1"/>
+          </p:cNvSpPr>
+          <p:nvPr>
+            <p:ph type="title"/>
+          </p:nvPr>
+        </p:nvSpPr>
+        <p:spPr/>
+        <p:txBody>
+          <a:bodyPr/>
+          <a:lstStyle/>
+          <a:p>
+            <a:r>
+              <a:rPr lang="en-US" dirty="0"/>
+              <a:t>Next Steps</a:t>
+            </a:r>
+          </a:p>
+        </p:txBody>
+      </p:sp>
+      <p:sp>
+        <p:nvSpPr>
+          <p:cNvPr id="3" name="Content Placeholder 2">
+            <a:extLst>
+              <a:ext uri="{FF2B5EF4-FFF2-40B4-BE49-F238E27FC236}">
+                <a16:creationId xmlns:a16="http://schemas.microsoft.com/office/drawing/2014/main" id="{91BFE29D-DC1A-4AB8-D0F7-E3E18B59E9BB}"/>
+              </a:ext>
+            </a:extLst>
+          </p:cNvPr>
+          <p:cNvSpPr>
+            <a:spLocks noGrp="1"/>
+          </p:cNvSpPr>
+          <p:nvPr>
+            <p:ph idx="1"/>
+          </p:nvPr>
+        </p:nvSpPr>
+        <p:spPr/>
+        <p:txBody>
+          <a:bodyPr/>
+          <a:lstStyle/>
+          <a:p>
+            <a:r>
+              <a:rPr lang="en-US" dirty="0"/>
+              <a:t>Using a UMAP representation having been clustered with 9-12 PC’s, find the most differentially expressed biomarkers per cluster.</a:t>
+            </a:r>
+          </a:p>
+          <a:p>
+            <a:r>
+              <a:rPr lang="en-US" dirty="0"/>
+              <a:t>Then, use these biomarkers to identify cell types in each cluster.</a:t>
+            </a:r>
+          </a:p>
+        </p:txBody>
+      </p:sp>
+    </p:spTree>
+    <p:extLst>
+      <p:ext uri="{BB962C8B-B14F-4D97-AF65-F5344CB8AC3E}">
+        <p14:creationId xmlns:p14="http://schemas.microsoft.com/office/powerpoint/2010/main" val="548373134"/>
       </p:ext>
     </p:extLst>
   </p:cSld>
@@ -4234,10 +5604,10 @@
       </p:sp>
       <p:pic>
         <p:nvPicPr>
-          <p:cNvPr id="7" name="Picture 6">
-            <a:extLst>
-              <a:ext uri="{FF2B5EF4-FFF2-40B4-BE49-F238E27FC236}">
-                <a16:creationId xmlns:a16="http://schemas.microsoft.com/office/drawing/2014/main" id="{D60B147D-CD21-80E0-C585-789DEAC43DB1}"/>
+          <p:cNvPr id="5" name="Picture 4">
+            <a:extLst>
+              <a:ext uri="{FF2B5EF4-FFF2-40B4-BE49-F238E27FC236}">
+                <a16:creationId xmlns:a16="http://schemas.microsoft.com/office/drawing/2014/main" id="{AEB4585C-53ED-CE57-B9C4-55505DA6D3C7}"/>
               </a:ext>
             </a:extLst>
           </p:cNvPr>
@@ -4254,8 +5624,8 @@
         </p:blipFill>
         <p:spPr>
           <a:xfrm>
-            <a:off x="1086505" y="3557587"/>
-            <a:ext cx="4466570" cy="938627"/>
+            <a:off x="1133476" y="3705226"/>
+            <a:ext cx="6038850" cy="918188"/>
           </a:xfrm>
           <a:prstGeom prst="rect">
             <a:avLst/>
@@ -4787,7 +6157,7 @@
           <p:cNvPr id="2" name="Title 1">
             <a:extLst>
               <a:ext uri="{FF2B5EF4-FFF2-40B4-BE49-F238E27FC236}">
-                <a16:creationId xmlns:a16="http://schemas.microsoft.com/office/drawing/2014/main" id="{FD4E3876-23D6-D5A7-5981-14DD17E82E21}"/>
+                <a16:creationId xmlns:a16="http://schemas.microsoft.com/office/drawing/2014/main" id="{76F95864-F064-96F8-86FC-B849DE214821}"/>
               </a:ext>
             </a:extLst>
           </p:cNvPr>
@@ -4805,7 +6175,7 @@
           <a:p>
             <a:r>
               <a:rPr lang="en-US" dirty="0"/>
-              <a:t>Visualizing PCA</a:t>
+              <a:t>Non Linear Dimensionality Reduction</a:t>
             </a:r>
           </a:p>
         </p:txBody>
@@ -4815,7 +6185,7 @@
           <p:cNvPr id="3" name="Content Placeholder 2">
             <a:extLst>
               <a:ext uri="{FF2B5EF4-FFF2-40B4-BE49-F238E27FC236}">
-                <a16:creationId xmlns:a16="http://schemas.microsoft.com/office/drawing/2014/main" id="{340AFA08-1435-31AC-F44C-E2890B7A820D}"/>
+                <a16:creationId xmlns:a16="http://schemas.microsoft.com/office/drawing/2014/main" id="{E60904E0-1ACA-677F-DEEB-D2AF19048FAC}"/>
               </a:ext>
             </a:extLst>
           </p:cNvPr>
@@ -4831,76 +6201,14 @@
           <a:bodyPr/>
           <a:lstStyle/>
           <a:p>
-            <a:r>
-              <a:rPr lang="en-US" dirty="0"/>
-              <a:t>The goal of PCA visualization, ultimately, is to determine how many PC’s we will choose as input to our clustering function. This is because clustering happens in the n-dimensional space that we choose.</a:t>
-            </a:r>
-          </a:p>
-          <a:p>
-            <a:r>
-              <a:rPr lang="en-US" dirty="0"/>
-              <a:t>On the way, however, we can look at the features (genes) most highly correlated with different PC’s:</a:t>
-            </a:r>
-          </a:p>
-          <a:p>
             <a:endParaRPr lang="en-US" dirty="0"/>
           </a:p>
-          <a:p>
-            <a:endParaRPr lang="en-US" dirty="0"/>
-          </a:p>
-          <a:p>
-            <a:r>
-              <a:rPr lang="en-US" dirty="0"/>
-              <a:t>The </a:t>
-            </a:r>
-            <a:r>
-              <a:rPr lang="en-US" dirty="0" err="1"/>
-              <a:t>VizDimLoadings</a:t>
-            </a:r>
-            <a:r>
-              <a:rPr lang="en-US" dirty="0"/>
-              <a:t> function shows graphs for each PC and the most highly correlated features.</a:t>
-            </a:r>
-          </a:p>
-          <a:p>
-            <a:endParaRPr lang="en-US" dirty="0"/>
-          </a:p>
-        </p:txBody>
-      </p:sp>
-      <p:pic>
-        <p:nvPicPr>
-          <p:cNvPr id="5" name="Picture 4">
-            <a:extLst>
-              <a:ext uri="{FF2B5EF4-FFF2-40B4-BE49-F238E27FC236}">
-                <a16:creationId xmlns:a16="http://schemas.microsoft.com/office/drawing/2014/main" id="{F1EA079C-A4CC-219A-D8F6-4D899BF95A04}"/>
-              </a:ext>
-            </a:extLst>
-          </p:cNvPr>
-          <p:cNvPicPr>
-            <a:picLocks noChangeAspect="1"/>
-          </p:cNvPicPr>
-          <p:nvPr/>
-        </p:nvPicPr>
-        <p:blipFill>
-          <a:blip r:embed="rId2"/>
-          <a:stretch>
-            <a:fillRect/>
-          </a:stretch>
-        </p:blipFill>
-        <p:spPr>
-          <a:xfrm>
-            <a:off x="1143000" y="4162424"/>
-            <a:ext cx="7690908" cy="409575"/>
-          </a:xfrm>
-          <a:prstGeom prst="rect">
-            <a:avLst/>
-          </a:prstGeom>
-        </p:spPr>
-      </p:pic>
+        </p:txBody>
+      </p:sp>
     </p:spTree>
     <p:extLst>
       <p:ext uri="{BB962C8B-B14F-4D97-AF65-F5344CB8AC3E}">
-        <p14:creationId xmlns:p14="http://schemas.microsoft.com/office/powerpoint/2010/main" val="2309164195"/>
+        <p14:creationId xmlns:p14="http://schemas.microsoft.com/office/powerpoint/2010/main" val="2171793810"/>
       </p:ext>
     </p:extLst>
   </p:cSld>

</xml_diff>